<commit_message>
change size of image
</commit_message>
<xml_diff>
--- a/presentations/1-Workshop Kickoff.pptx
+++ b/presentations/1-Workshop Kickoff.pptx
@@ -7848,6 +7848,30 @@
           </a:prstGeom>
         </p:spPr>
       </p:pic>
+      <p:pic>
+        <p:nvPicPr>
+          <p:cNvPr id="9" name="Picture 8"/>
+          <p:cNvPicPr>
+            <a:picLocks noChangeAspect="1"/>
+          </p:cNvPicPr>
+          <p:nvPr/>
+        </p:nvPicPr>
+        <p:blipFill>
+          <a:blip r:embed="rId7"/>
+          <a:stretch>
+            <a:fillRect/>
+          </a:stretch>
+        </p:blipFill>
+        <p:spPr>
+          <a:xfrm>
+            <a:off x="129655" y="4417251"/>
+            <a:ext cx="623455" cy="609123"/>
+          </a:xfrm>
+          <a:prstGeom prst="rect">
+            <a:avLst/>
+          </a:prstGeom>
+        </p:spPr>
+      </p:pic>
     </p:spTree>
     <p:extLst>
       <p:ext uri="{BB962C8B-B14F-4D97-AF65-F5344CB8AC3E}">
@@ -8142,8 +8166,8 @@
         </p:blipFill>
         <p:spPr>
           <a:xfrm>
-            <a:off x="8039100" y="3985615"/>
-            <a:ext cx="1104900" cy="1079500"/>
+            <a:off x="8379992" y="4318671"/>
+            <a:ext cx="764007" cy="746444"/>
           </a:xfrm>
           <a:prstGeom prst="rect">
             <a:avLst/>

</xml_diff>